<commit_message>
Guión actualizado y ppt punto 6
</commit_message>
<xml_diff>
--- a/Control de aforo.pptx
+++ b/Control de aforo.pptx
@@ -117,6 +117,11 @@
       </a:defRPr>
     </a:lvl9pPr>
   </p:defaultTextStyle>
+  <p:extLst>
+    <p:ext uri="{EFAFB233-063F-42B5-8137-9DF3F51BA10A}">
+      <p15:sldGuideLst xmlns:p15="http://schemas.microsoft.com/office/powerpoint/2012/main"/>
+    </p:ext>
+  </p:extLst>
 </p:presentation>
 </file>
 
@@ -14125,31 +14130,348 @@
           </a:p>
         </p:txBody>
       </p:sp>
-      <p:sp>
-        <p:nvSpPr>
-          <p:cNvPr id="3" name="Marcador de contenido 2">
+      <p:pic>
+        <p:nvPicPr>
+          <p:cNvPr id="1026" name="Picture 2">
             <a:extLst>
               <a:ext uri="{FF2B5EF4-FFF2-40B4-BE49-F238E27FC236}">
-                <a16:creationId xmlns:a16="http://schemas.microsoft.com/office/drawing/2014/main" id="{A6F901F1-53E7-A146-8252-0A3FB600E6B0}"/>
+                <a16:creationId xmlns:a16="http://schemas.microsoft.com/office/drawing/2014/main" id="{4C435318-EDC8-544F-A763-315FB79E3C56}"/>
               </a:ext>
             </a:extLst>
           </p:cNvPr>
-          <p:cNvSpPr>
-            <a:spLocks noGrp="1"/>
-          </p:cNvSpPr>
+          <p:cNvPicPr>
+            <a:picLocks noGrp="1" noChangeAspect="1" noChangeArrowheads="1"/>
+          </p:cNvPicPr>
           <p:nvPr>
             <p:ph idx="1"/>
           </p:nvPr>
+        </p:nvPicPr>
+        <p:blipFill>
+          <a:blip r:embed="rId2">
+            <a:extLst>
+              <a:ext uri="{28A0092B-C50C-407E-A947-70E740481C1C}">
+                <a14:useLocalDpi xmlns:a14="http://schemas.microsoft.com/office/drawing/2010/main" val="0"/>
+              </a:ext>
+            </a:extLst>
+          </a:blip>
+          <a:srcRect/>
+          <a:stretch>
+            <a:fillRect/>
+          </a:stretch>
+        </p:blipFill>
+        <p:spPr bwMode="auto">
+          <a:xfrm>
+            <a:off x="1893603" y="1814827"/>
+            <a:ext cx="2588206" cy="1718221"/>
+          </a:xfrm>
+          <a:prstGeom prst="rect">
+            <a:avLst/>
+          </a:prstGeom>
+          <a:noFill/>
+          <a:extLst>
+            <a:ext uri="{909E8E84-426E-40DD-AFC4-6F175D3DCCD1}">
+              <a14:hiddenFill xmlns:a14="http://schemas.microsoft.com/office/drawing/2010/main">
+                <a:solidFill>
+                  <a:srgbClr val="FFFFFF"/>
+                </a:solidFill>
+              </a14:hiddenFill>
+            </a:ext>
+          </a:extLst>
+        </p:spPr>
+      </p:pic>
+      <p:sp>
+        <p:nvSpPr>
+          <p:cNvPr id="4" name="TextBox 3">
+            <a:extLst>
+              <a:ext uri="{FF2B5EF4-FFF2-40B4-BE49-F238E27FC236}">
+                <a16:creationId xmlns:a16="http://schemas.microsoft.com/office/drawing/2014/main" id="{C7AB5C41-3ABD-7846-89A9-806F039F0963}"/>
+              </a:ext>
+            </a:extLst>
+          </p:cNvPr>
+          <p:cNvSpPr txBox="1"/>
+          <p:nvPr/>
         </p:nvSpPr>
-        <p:spPr/>
+        <p:spPr>
+          <a:xfrm>
+            <a:off x="1893603" y="3713359"/>
+            <a:ext cx="2588206" cy="369332"/>
+          </a:xfrm>
+          <a:prstGeom prst="rect">
+            <a:avLst/>
+          </a:prstGeom>
+          <a:noFill/>
+        </p:spPr>
         <p:txBody>
-          <a:bodyPr/>
+          <a:bodyPr wrap="square" rtlCol="0">
+            <a:spAutoFit/>
+          </a:bodyPr>
           <a:lstStyle/>
           <a:p>
-            <a:endParaRPr lang="es-ES"/>
+            <a:pPr algn="ctr"/>
+            <a:r>
+              <a:rPr lang="en-GB" dirty="0"/>
+              <a:t>S</a:t>
+            </a:r>
+            <a:r>
+              <a:rPr lang="en-ES" dirty="0"/>
+              <a:t>istema de ultrasonidos</a:t>
+            </a:r>
           </a:p>
         </p:txBody>
       </p:sp>
+      <p:sp>
+        <p:nvSpPr>
+          <p:cNvPr id="6" name="TextBox 5">
+            <a:extLst>
+              <a:ext uri="{FF2B5EF4-FFF2-40B4-BE49-F238E27FC236}">
+                <a16:creationId xmlns:a16="http://schemas.microsoft.com/office/drawing/2014/main" id="{B5CAC782-9959-2946-9D5A-FC1C0BA71E26}"/>
+              </a:ext>
+            </a:extLst>
+          </p:cNvPr>
+          <p:cNvSpPr txBox="1"/>
+          <p:nvPr/>
+        </p:nvSpPr>
+        <p:spPr>
+          <a:xfrm>
+            <a:off x="7011328" y="3708455"/>
+            <a:ext cx="2368091" cy="369332"/>
+          </a:xfrm>
+          <a:prstGeom prst="rect">
+            <a:avLst/>
+          </a:prstGeom>
+          <a:noFill/>
+        </p:spPr>
+        <p:txBody>
+          <a:bodyPr wrap="square" rtlCol="0">
+            <a:spAutoFit/>
+          </a:bodyPr>
+          <a:lstStyle/>
+          <a:p>
+            <a:pPr algn="ctr"/>
+            <a:r>
+              <a:rPr lang="en-GB" dirty="0"/>
+              <a:t>S</a:t>
+            </a:r>
+            <a:r>
+              <a:rPr lang="en-ES" dirty="0"/>
+              <a:t>istema de infrarrojos</a:t>
+            </a:r>
+          </a:p>
+        </p:txBody>
+      </p:sp>
+      <p:sp>
+        <p:nvSpPr>
+          <p:cNvPr id="7" name="TextBox 6">
+            <a:extLst>
+              <a:ext uri="{FF2B5EF4-FFF2-40B4-BE49-F238E27FC236}">
+                <a16:creationId xmlns:a16="http://schemas.microsoft.com/office/drawing/2014/main" id="{0E09D241-E708-D342-B770-479BED34F097}"/>
+              </a:ext>
+            </a:extLst>
+          </p:cNvPr>
+          <p:cNvSpPr txBox="1"/>
+          <p:nvPr/>
+        </p:nvSpPr>
+        <p:spPr>
+          <a:xfrm>
+            <a:off x="1893602" y="6208538"/>
+            <a:ext cx="2588206" cy="369332"/>
+          </a:xfrm>
+          <a:prstGeom prst="rect">
+            <a:avLst/>
+          </a:prstGeom>
+          <a:noFill/>
+        </p:spPr>
+        <p:txBody>
+          <a:bodyPr wrap="square" rtlCol="0">
+            <a:spAutoFit/>
+          </a:bodyPr>
+          <a:lstStyle/>
+          <a:p>
+            <a:pPr algn="ctr"/>
+            <a:r>
+              <a:rPr lang="es-ES" dirty="0"/>
+              <a:t>Reconocimiento facial</a:t>
+            </a:r>
+            <a:endParaRPr lang="en-ES" dirty="0"/>
+          </a:p>
+        </p:txBody>
+      </p:sp>
+      <p:sp>
+        <p:nvSpPr>
+          <p:cNvPr id="8" name="TextBox 7">
+            <a:extLst>
+              <a:ext uri="{FF2B5EF4-FFF2-40B4-BE49-F238E27FC236}">
+                <a16:creationId xmlns:a16="http://schemas.microsoft.com/office/drawing/2014/main" id="{C7EE683F-4434-654E-B795-CB0E384F7E1E}"/>
+              </a:ext>
+            </a:extLst>
+          </p:cNvPr>
+          <p:cNvSpPr txBox="1"/>
+          <p:nvPr/>
+        </p:nvSpPr>
+        <p:spPr>
+          <a:xfrm>
+            <a:off x="6898325" y="6208538"/>
+            <a:ext cx="2588206" cy="369332"/>
+          </a:xfrm>
+          <a:prstGeom prst="rect">
+            <a:avLst/>
+          </a:prstGeom>
+          <a:noFill/>
+        </p:spPr>
+        <p:txBody>
+          <a:bodyPr wrap="square" rtlCol="0">
+            <a:spAutoFit/>
+          </a:bodyPr>
+          <a:lstStyle/>
+          <a:p>
+            <a:pPr algn="ctr"/>
+            <a:r>
+              <a:rPr lang="es-ES" dirty="0"/>
+              <a:t>Módulo NFC</a:t>
+            </a:r>
+            <a:endParaRPr lang="en-ES" dirty="0"/>
+          </a:p>
+        </p:txBody>
+      </p:sp>
+      <p:pic>
+        <p:nvPicPr>
+          <p:cNvPr id="1028" name="Picture 4">
+            <a:extLst>
+              <a:ext uri="{FF2B5EF4-FFF2-40B4-BE49-F238E27FC236}">
+                <a16:creationId xmlns:a16="http://schemas.microsoft.com/office/drawing/2014/main" id="{B2A48AAE-8CC7-B54C-BA27-195712932D45}"/>
+              </a:ext>
+            </a:extLst>
+          </p:cNvPr>
+          <p:cNvPicPr>
+            <a:picLocks noChangeAspect="1" noChangeArrowheads="1"/>
+          </p:cNvPicPr>
+          <p:nvPr/>
+        </p:nvPicPr>
+        <p:blipFill>
+          <a:blip r:embed="rId3">
+            <a:extLst>
+              <a:ext uri="{28A0092B-C50C-407E-A947-70E740481C1C}">
+                <a14:useLocalDpi xmlns:a14="http://schemas.microsoft.com/office/drawing/2010/main" val="0"/>
+              </a:ext>
+            </a:extLst>
+          </a:blip>
+          <a:srcRect/>
+          <a:stretch>
+            <a:fillRect/>
+          </a:stretch>
+        </p:blipFill>
+        <p:spPr bwMode="auto">
+          <a:xfrm>
+            <a:off x="7011329" y="1829387"/>
+            <a:ext cx="2362200" cy="1689100"/>
+          </a:xfrm>
+          <a:prstGeom prst="rect">
+            <a:avLst/>
+          </a:prstGeom>
+          <a:noFill/>
+          <a:extLst>
+            <a:ext uri="{909E8E84-426E-40DD-AFC4-6F175D3DCCD1}">
+              <a14:hiddenFill xmlns:a14="http://schemas.microsoft.com/office/drawing/2010/main">
+                <a:solidFill>
+                  <a:srgbClr val="FFFFFF"/>
+                </a:solidFill>
+              </a14:hiddenFill>
+            </a:ext>
+          </a:extLst>
+        </p:spPr>
+      </p:pic>
+      <p:pic>
+        <p:nvPicPr>
+          <p:cNvPr id="1030" name="Picture 6" descr="Reconocimiento facial para las cámaras de videovigilancia de los hogares y  oficinas • CASADOMO">
+            <a:extLst>
+              <a:ext uri="{FF2B5EF4-FFF2-40B4-BE49-F238E27FC236}">
+                <a16:creationId xmlns:a16="http://schemas.microsoft.com/office/drawing/2014/main" id="{7BC710A5-3CAD-0841-B94B-2E8018C5BBCF}"/>
+              </a:ext>
+            </a:extLst>
+          </p:cNvPr>
+          <p:cNvPicPr>
+            <a:picLocks noChangeAspect="1" noChangeArrowheads="1"/>
+          </p:cNvPicPr>
+          <p:nvPr/>
+        </p:nvPicPr>
+        <p:blipFill>
+          <a:blip r:embed="rId4">
+            <a:extLst>
+              <a:ext uri="{28A0092B-C50C-407E-A947-70E740481C1C}">
+                <a14:useLocalDpi xmlns:a14="http://schemas.microsoft.com/office/drawing/2010/main" val="0"/>
+              </a:ext>
+            </a:extLst>
+          </a:blip>
+          <a:srcRect/>
+          <a:stretch>
+            <a:fillRect/>
+          </a:stretch>
+        </p:blipFill>
+        <p:spPr bwMode="auto">
+          <a:xfrm>
+            <a:off x="1743930" y="4222935"/>
+            <a:ext cx="2887551" cy="1754187"/>
+          </a:xfrm>
+          <a:prstGeom prst="rect">
+            <a:avLst/>
+          </a:prstGeom>
+          <a:noFill/>
+          <a:extLst>
+            <a:ext uri="{909E8E84-426E-40DD-AFC4-6F175D3DCCD1}">
+              <a14:hiddenFill xmlns:a14="http://schemas.microsoft.com/office/drawing/2010/main">
+                <a:solidFill>
+                  <a:srgbClr val="FFFFFF"/>
+                </a:solidFill>
+              </a14:hiddenFill>
+            </a:ext>
+          </a:extLst>
+        </p:spPr>
+      </p:pic>
+      <p:pic>
+        <p:nvPicPr>
+          <p:cNvPr id="1032" name="Picture 8">
+            <a:extLst>
+              <a:ext uri="{FF2B5EF4-FFF2-40B4-BE49-F238E27FC236}">
+                <a16:creationId xmlns:a16="http://schemas.microsoft.com/office/drawing/2014/main" id="{5E71EB3A-782B-9548-A6A3-193C5C8111E4}"/>
+              </a:ext>
+            </a:extLst>
+          </p:cNvPr>
+          <p:cNvPicPr>
+            <a:picLocks noChangeAspect="1" noChangeArrowheads="1"/>
+          </p:cNvPicPr>
+          <p:nvPr/>
+        </p:nvPicPr>
+        <p:blipFill rotWithShape="1">
+          <a:blip r:embed="rId5">
+            <a:extLst>
+              <a:ext uri="{28A0092B-C50C-407E-A947-70E740481C1C}">
+                <a14:useLocalDpi xmlns:a14="http://schemas.microsoft.com/office/drawing/2010/main" val="0"/>
+              </a:ext>
+            </a:extLst>
+          </a:blip>
+          <a:srcRect r="9630" b="2288"/>
+          <a:stretch/>
+        </p:blipFill>
+        <p:spPr bwMode="auto">
+          <a:xfrm>
+            <a:off x="6503284" y="4274805"/>
+            <a:ext cx="3378289" cy="1650446"/>
+          </a:xfrm>
+          <a:prstGeom prst="rect">
+            <a:avLst/>
+          </a:prstGeom>
+          <a:noFill/>
+          <a:extLst>
+            <a:ext uri="{909E8E84-426E-40DD-AFC4-6F175D3DCCD1}">
+              <a14:hiddenFill xmlns:a14="http://schemas.microsoft.com/office/drawing/2010/main">
+                <a:solidFill>
+                  <a:srgbClr val="FFFFFF"/>
+                </a:solidFill>
+              </a14:hiddenFill>
+            </a:ext>
+          </a:extLst>
+        </p:spPr>
+      </p:pic>
     </p:spTree>
     <p:extLst>
       <p:ext uri="{BB962C8B-B14F-4D97-AF65-F5344CB8AC3E}">
@@ -14293,31 +14615,795 @@
           </a:p>
         </p:txBody>
       </p:sp>
-      <p:sp>
-        <p:nvSpPr>
-          <p:cNvPr id="3" name="Marcador de contenido 2">
+      <p:graphicFrame>
+        <p:nvGraphicFramePr>
+          <p:cNvPr id="4" name="Tabla 4">
             <a:extLst>
               <a:ext uri="{FF2B5EF4-FFF2-40B4-BE49-F238E27FC236}">
-                <a16:creationId xmlns:a16="http://schemas.microsoft.com/office/drawing/2014/main" id="{39F815AA-CA12-C249-8EBD-D1DFE48D2491}"/>
+                <a16:creationId xmlns:a16="http://schemas.microsoft.com/office/drawing/2014/main" id="{078B36DE-8716-6341-B8D0-A9BDDFA4D4AA}"/>
               </a:ext>
             </a:extLst>
           </p:cNvPr>
-          <p:cNvSpPr>
-            <a:spLocks noGrp="1"/>
-          </p:cNvSpPr>
+          <p:cNvGraphicFramePr>
+            <a:graphicFrameLocks noGrp="1"/>
+          </p:cNvGraphicFramePr>
           <p:nvPr>
             <p:ph idx="1"/>
+            <p:extLst>
+              <p:ext uri="{D42A27DB-BD31-4B8C-83A1-F6EECF244321}">
+                <p14:modId xmlns:p14="http://schemas.microsoft.com/office/powerpoint/2010/main" val="1492935911"/>
+              </p:ext>
+            </p:extLst>
           </p:nvPr>
-        </p:nvSpPr>
-        <p:spPr/>
-        <p:txBody>
-          <a:bodyPr/>
-          <a:lstStyle/>
-          <a:p>
-            <a:endParaRPr lang="es-ES" dirty="0"/>
-          </a:p>
-        </p:txBody>
-      </p:sp>
+        </p:nvGraphicFramePr>
+        <p:xfrm>
+          <a:off x="195432" y="1776112"/>
+          <a:ext cx="11801136" cy="3903888"/>
+        </p:xfrm>
+        <a:graphic>
+          <a:graphicData uri="http://schemas.openxmlformats.org/drawingml/2006/table">
+            <a:tbl>
+              <a:tblPr firstRow="1" bandRow="1">
+                <a:tableStyleId>{7DF18680-E054-41AD-8BC1-D1AEF772440D}</a:tableStyleId>
+              </a:tblPr>
+              <a:tblGrid>
+                <a:gridCol w="1475142">
+                  <a:extLst>
+                    <a:ext uri="{9D8B030D-6E8A-4147-A177-3AD203B41FA5}">
+                      <a16:colId xmlns:a16="http://schemas.microsoft.com/office/drawing/2014/main" val="510356394"/>
+                    </a:ext>
+                  </a:extLst>
+                </a:gridCol>
+                <a:gridCol w="1475142">
+                  <a:extLst>
+                    <a:ext uri="{9D8B030D-6E8A-4147-A177-3AD203B41FA5}">
+                      <a16:colId xmlns:a16="http://schemas.microsoft.com/office/drawing/2014/main" val="3299021958"/>
+                    </a:ext>
+                  </a:extLst>
+                </a:gridCol>
+                <a:gridCol w="1475142">
+                  <a:extLst>
+                    <a:ext uri="{9D8B030D-6E8A-4147-A177-3AD203B41FA5}">
+                      <a16:colId xmlns:a16="http://schemas.microsoft.com/office/drawing/2014/main" val="1455915437"/>
+                    </a:ext>
+                  </a:extLst>
+                </a:gridCol>
+                <a:gridCol w="1475142">
+                  <a:extLst>
+                    <a:ext uri="{9D8B030D-6E8A-4147-A177-3AD203B41FA5}">
+                      <a16:colId xmlns:a16="http://schemas.microsoft.com/office/drawing/2014/main" val="3692964118"/>
+                    </a:ext>
+                  </a:extLst>
+                </a:gridCol>
+                <a:gridCol w="1475142">
+                  <a:extLst>
+                    <a:ext uri="{9D8B030D-6E8A-4147-A177-3AD203B41FA5}">
+                      <a16:colId xmlns:a16="http://schemas.microsoft.com/office/drawing/2014/main" val="2275534832"/>
+                    </a:ext>
+                  </a:extLst>
+                </a:gridCol>
+                <a:gridCol w="1475142">
+                  <a:extLst>
+                    <a:ext uri="{9D8B030D-6E8A-4147-A177-3AD203B41FA5}">
+                      <a16:colId xmlns:a16="http://schemas.microsoft.com/office/drawing/2014/main" val="486481465"/>
+                    </a:ext>
+                  </a:extLst>
+                </a:gridCol>
+                <a:gridCol w="1475142">
+                  <a:extLst>
+                    <a:ext uri="{9D8B030D-6E8A-4147-A177-3AD203B41FA5}">
+                      <a16:colId xmlns:a16="http://schemas.microsoft.com/office/drawing/2014/main" val="3256080889"/>
+                    </a:ext>
+                  </a:extLst>
+                </a:gridCol>
+                <a:gridCol w="1475142">
+                  <a:extLst>
+                    <a:ext uri="{9D8B030D-6E8A-4147-A177-3AD203B41FA5}">
+                      <a16:colId xmlns:a16="http://schemas.microsoft.com/office/drawing/2014/main" val="4011795302"/>
+                    </a:ext>
+                  </a:extLst>
+                </a:gridCol>
+              </a:tblGrid>
+              <a:tr h="975972">
+                <a:tc>
+                  <a:txBody>
+                    <a:bodyPr/>
+                    <a:lstStyle/>
+                    <a:p>
+                      <a:pPr algn="ctr"/>
+                      <a:endParaRPr lang="es-ES" dirty="0"/>
+                    </a:p>
+                  </a:txBody>
+                  <a:tcPr/>
+                </a:tc>
+                <a:tc>
+                  <a:txBody>
+                    <a:bodyPr/>
+                    <a:lstStyle/>
+                    <a:p>
+                      <a:pPr algn="ctr"/>
+                      <a:r>
+                        <a:rPr lang="es-ES" dirty="0" err="1"/>
+                        <a:t>Prog</a:t>
+                      </a:r>
+                      <a:r>
+                        <a:rPr lang="es-ES" dirty="0"/>
+                        <a:t>. placa base</a:t>
+                      </a:r>
+                    </a:p>
+                  </a:txBody>
+                  <a:tcPr/>
+                </a:tc>
+                <a:tc>
+                  <a:txBody>
+                    <a:bodyPr/>
+                    <a:lstStyle/>
+                    <a:p>
+                      <a:pPr algn="ctr"/>
+                      <a:r>
+                        <a:rPr lang="es-ES" dirty="0" err="1"/>
+                        <a:t>Mqtt</a:t>
+                      </a:r>
+                      <a:endParaRPr lang="es-ES" dirty="0"/>
+                    </a:p>
+                  </a:txBody>
+                  <a:tcPr/>
+                </a:tc>
+                <a:tc>
+                  <a:txBody>
+                    <a:bodyPr/>
+                    <a:lstStyle/>
+                    <a:p>
+                      <a:pPr algn="ctr"/>
+                      <a:r>
+                        <a:rPr lang="es-ES" dirty="0"/>
+                        <a:t>Base de datos</a:t>
+                      </a:r>
+                    </a:p>
+                  </a:txBody>
+                  <a:tcPr/>
+                </a:tc>
+                <a:tc>
+                  <a:txBody>
+                    <a:bodyPr/>
+                    <a:lstStyle/>
+                    <a:p>
+                      <a:pPr algn="ctr"/>
+                      <a:r>
+                        <a:rPr lang="es-ES" dirty="0"/>
+                        <a:t>Servidor</a:t>
+                      </a:r>
+                    </a:p>
+                  </a:txBody>
+                  <a:tcPr/>
+                </a:tc>
+                <a:tc>
+                  <a:txBody>
+                    <a:bodyPr/>
+                    <a:lstStyle/>
+                    <a:p>
+                      <a:pPr algn="ctr"/>
+                      <a:r>
+                        <a:rPr lang="es-ES" dirty="0"/>
+                        <a:t>Página web</a:t>
+                      </a:r>
+                    </a:p>
+                  </a:txBody>
+                  <a:tcPr/>
+                </a:tc>
+                <a:tc>
+                  <a:txBody>
+                    <a:bodyPr/>
+                    <a:lstStyle/>
+                    <a:p>
+                      <a:pPr algn="ctr"/>
+                      <a:r>
+                        <a:rPr lang="es-ES" dirty="0"/>
+                        <a:t>Interconexión total</a:t>
+                      </a:r>
+                    </a:p>
+                  </a:txBody>
+                  <a:tcPr/>
+                </a:tc>
+                <a:tc>
+                  <a:txBody>
+                    <a:bodyPr/>
+                    <a:lstStyle/>
+                    <a:p>
+                      <a:pPr algn="ctr"/>
+                      <a:r>
+                        <a:rPr lang="es-ES" dirty="0"/>
+                        <a:t>Revisión final</a:t>
+                      </a:r>
+                    </a:p>
+                  </a:txBody>
+                  <a:tcPr/>
+                </a:tc>
+                <a:extLst>
+                  <a:ext uri="{0D108BD9-81ED-4DB2-BD59-A6C34878D82A}">
+                    <a16:rowId xmlns:a16="http://schemas.microsoft.com/office/drawing/2014/main" val="3902382258"/>
+                  </a:ext>
+                </a:extLst>
+              </a:tr>
+              <a:tr h="975972">
+                <a:tc>
+                  <a:txBody>
+                    <a:bodyPr/>
+                    <a:lstStyle/>
+                    <a:p>
+                      <a:pPr algn="ctr"/>
+                      <a:r>
+                        <a:rPr lang="es-ES" dirty="0"/>
+                        <a:t>Nº de semanas</a:t>
+                      </a:r>
+                    </a:p>
+                  </a:txBody>
+                  <a:tcPr/>
+                </a:tc>
+                <a:tc>
+                  <a:txBody>
+                    <a:bodyPr/>
+                    <a:lstStyle/>
+                    <a:p>
+                      <a:pPr algn="ctr"/>
+                      <a:endParaRPr lang="es-ES" dirty="0"/>
+                    </a:p>
+                    <a:p>
+                      <a:pPr algn="ctr"/>
+                      <a:r>
+                        <a:rPr lang="es-ES" dirty="0"/>
+                        <a:t>2</a:t>
+                      </a:r>
+                    </a:p>
+                  </a:txBody>
+                  <a:tcPr/>
+                </a:tc>
+                <a:tc>
+                  <a:txBody>
+                    <a:bodyPr/>
+                    <a:lstStyle/>
+                    <a:p>
+                      <a:pPr algn="ctr"/>
+                      <a:endParaRPr lang="es-ES" dirty="0"/>
+                    </a:p>
+                    <a:p>
+                      <a:pPr algn="ctr"/>
+                      <a:r>
+                        <a:rPr lang="es-ES" dirty="0"/>
+                        <a:t>2-3</a:t>
+                      </a:r>
+                    </a:p>
+                  </a:txBody>
+                  <a:tcPr/>
+                </a:tc>
+                <a:tc>
+                  <a:txBody>
+                    <a:bodyPr/>
+                    <a:lstStyle/>
+                    <a:p>
+                      <a:pPr algn="ctr"/>
+                      <a:endParaRPr lang="es-ES" dirty="0"/>
+                    </a:p>
+                    <a:p>
+                      <a:pPr algn="ctr"/>
+                      <a:r>
+                        <a:rPr lang="es-ES" dirty="0"/>
+                        <a:t>2</a:t>
+                      </a:r>
+                    </a:p>
+                  </a:txBody>
+                  <a:tcPr/>
+                </a:tc>
+                <a:tc>
+                  <a:txBody>
+                    <a:bodyPr/>
+                    <a:lstStyle/>
+                    <a:p>
+                      <a:pPr algn="ctr"/>
+                      <a:endParaRPr lang="es-ES" dirty="0"/>
+                    </a:p>
+                    <a:p>
+                      <a:pPr algn="ctr"/>
+                      <a:r>
+                        <a:rPr lang="es-ES" dirty="0"/>
+                        <a:t>3</a:t>
+                      </a:r>
+                    </a:p>
+                  </a:txBody>
+                  <a:tcPr/>
+                </a:tc>
+                <a:tc>
+                  <a:txBody>
+                    <a:bodyPr/>
+                    <a:lstStyle/>
+                    <a:p>
+                      <a:pPr algn="ctr"/>
+                      <a:endParaRPr lang="es-ES" dirty="0"/>
+                    </a:p>
+                    <a:p>
+                      <a:pPr algn="ctr"/>
+                      <a:r>
+                        <a:rPr lang="es-ES" dirty="0"/>
+                        <a:t>2</a:t>
+                      </a:r>
+                    </a:p>
+                  </a:txBody>
+                  <a:tcPr/>
+                </a:tc>
+                <a:tc>
+                  <a:txBody>
+                    <a:bodyPr/>
+                    <a:lstStyle/>
+                    <a:p>
+                      <a:pPr algn="ctr"/>
+                      <a:endParaRPr lang="es-ES" dirty="0"/>
+                    </a:p>
+                    <a:p>
+                      <a:pPr algn="ctr"/>
+                      <a:r>
+                        <a:rPr lang="es-ES" dirty="0"/>
+                        <a:t>1</a:t>
+                      </a:r>
+                    </a:p>
+                  </a:txBody>
+                  <a:tcPr/>
+                </a:tc>
+                <a:tc>
+                  <a:txBody>
+                    <a:bodyPr/>
+                    <a:lstStyle/>
+                    <a:p>
+                      <a:pPr algn="ctr"/>
+                      <a:endParaRPr lang="es-ES" dirty="0"/>
+                    </a:p>
+                    <a:p>
+                      <a:pPr algn="ctr"/>
+                      <a:r>
+                        <a:rPr lang="es-ES" dirty="0"/>
+                        <a:t>3</a:t>
+                      </a:r>
+                    </a:p>
+                  </a:txBody>
+                  <a:tcPr/>
+                </a:tc>
+                <a:extLst>
+                  <a:ext uri="{0D108BD9-81ED-4DB2-BD59-A6C34878D82A}">
+                    <a16:rowId xmlns:a16="http://schemas.microsoft.com/office/drawing/2014/main" val="3988462703"/>
+                  </a:ext>
+                </a:extLst>
+              </a:tr>
+              <a:tr h="975972">
+                <a:tc>
+                  <a:txBody>
+                    <a:bodyPr/>
+                    <a:lstStyle/>
+                    <a:p>
+                      <a:pPr algn="ctr"/>
+                      <a:r>
+                        <a:rPr lang="es-ES" dirty="0"/>
+                        <a:t>Nº de personas</a:t>
+                      </a:r>
+                    </a:p>
+                  </a:txBody>
+                  <a:tcPr/>
+                </a:tc>
+                <a:tc>
+                  <a:txBody>
+                    <a:bodyPr/>
+                    <a:lstStyle/>
+                    <a:p>
+                      <a:pPr algn="ctr"/>
+                      <a:endParaRPr lang="es-ES" dirty="0"/>
+                    </a:p>
+                    <a:p>
+                      <a:pPr algn="ctr"/>
+                      <a:r>
+                        <a:rPr lang="es-ES" dirty="0"/>
+                        <a:t>2</a:t>
+                      </a:r>
+                    </a:p>
+                  </a:txBody>
+                  <a:tcPr/>
+                </a:tc>
+                <a:tc>
+                  <a:txBody>
+                    <a:bodyPr/>
+                    <a:lstStyle/>
+                    <a:p>
+                      <a:pPr algn="ctr"/>
+                      <a:endParaRPr lang="es-ES" dirty="0"/>
+                    </a:p>
+                    <a:p>
+                      <a:pPr algn="ctr"/>
+                      <a:r>
+                        <a:rPr lang="es-ES" dirty="0"/>
+                        <a:t>2</a:t>
+                      </a:r>
+                    </a:p>
+                  </a:txBody>
+                  <a:tcPr/>
+                </a:tc>
+                <a:tc>
+                  <a:txBody>
+                    <a:bodyPr/>
+                    <a:lstStyle/>
+                    <a:p>
+                      <a:pPr algn="ctr"/>
+                      <a:endParaRPr lang="es-ES" dirty="0"/>
+                    </a:p>
+                    <a:p>
+                      <a:pPr algn="ctr"/>
+                      <a:r>
+                        <a:rPr lang="es-ES" dirty="0"/>
+                        <a:t>1-2</a:t>
+                      </a:r>
+                    </a:p>
+                  </a:txBody>
+                  <a:tcPr/>
+                </a:tc>
+                <a:tc>
+                  <a:txBody>
+                    <a:bodyPr/>
+                    <a:lstStyle/>
+                    <a:p>
+                      <a:pPr algn="ctr"/>
+                      <a:endParaRPr lang="es-ES" dirty="0"/>
+                    </a:p>
+                    <a:p>
+                      <a:pPr algn="ctr"/>
+                      <a:r>
+                        <a:rPr lang="es-ES" dirty="0"/>
+                        <a:t>4</a:t>
+                      </a:r>
+                    </a:p>
+                  </a:txBody>
+                  <a:tcPr/>
+                </a:tc>
+                <a:tc>
+                  <a:txBody>
+                    <a:bodyPr/>
+                    <a:lstStyle/>
+                    <a:p>
+                      <a:pPr algn="ctr"/>
+                      <a:endParaRPr lang="es-ES" dirty="0"/>
+                    </a:p>
+                    <a:p>
+                      <a:pPr algn="ctr"/>
+                      <a:r>
+                        <a:rPr lang="es-ES" dirty="0"/>
+                        <a:t>1</a:t>
+                      </a:r>
+                    </a:p>
+                  </a:txBody>
+                  <a:tcPr/>
+                </a:tc>
+                <a:tc>
+                  <a:txBody>
+                    <a:bodyPr/>
+                    <a:lstStyle/>
+                    <a:p>
+                      <a:pPr algn="ctr"/>
+                      <a:endParaRPr lang="es-ES" dirty="0"/>
+                    </a:p>
+                    <a:p>
+                      <a:pPr algn="ctr"/>
+                      <a:r>
+                        <a:rPr lang="es-ES" dirty="0"/>
+                        <a:t>4</a:t>
+                      </a:r>
+                    </a:p>
+                  </a:txBody>
+                  <a:tcPr/>
+                </a:tc>
+                <a:tc>
+                  <a:txBody>
+                    <a:bodyPr/>
+                    <a:lstStyle/>
+                    <a:p>
+                      <a:pPr algn="ctr"/>
+                      <a:endParaRPr lang="es-ES" dirty="0"/>
+                    </a:p>
+                    <a:p>
+                      <a:pPr algn="ctr"/>
+                      <a:r>
+                        <a:rPr lang="es-ES" dirty="0"/>
+                        <a:t>4</a:t>
+                      </a:r>
+                    </a:p>
+                  </a:txBody>
+                  <a:tcPr/>
+                </a:tc>
+                <a:extLst>
+                  <a:ext uri="{0D108BD9-81ED-4DB2-BD59-A6C34878D82A}">
+                    <a16:rowId xmlns:a16="http://schemas.microsoft.com/office/drawing/2014/main" val="1613892656"/>
+                  </a:ext>
+                </a:extLst>
+              </a:tr>
+              <a:tr h="975972">
+                <a:tc>
+                  <a:txBody>
+                    <a:bodyPr/>
+                    <a:lstStyle/>
+                    <a:p>
+                      <a:pPr algn="ctr"/>
+                      <a:r>
+                        <a:rPr lang="es-ES" dirty="0"/>
+                        <a:t>Orden de ejecución</a:t>
+                      </a:r>
+                    </a:p>
+                  </a:txBody>
+                  <a:tcPr/>
+                </a:tc>
+                <a:tc>
+                  <a:txBody>
+                    <a:bodyPr/>
+                    <a:lstStyle/>
+                    <a:p>
+                      <a:pPr algn="ctr"/>
+                      <a:endParaRPr lang="es-ES" dirty="0"/>
+                    </a:p>
+                    <a:p>
+                      <a:pPr algn="ctr"/>
+                      <a:r>
+                        <a:rPr lang="es-ES" dirty="0"/>
+                        <a:t>1º</a:t>
+                      </a:r>
+                    </a:p>
+                  </a:txBody>
+                  <a:tcPr/>
+                </a:tc>
+                <a:tc>
+                  <a:txBody>
+                    <a:bodyPr/>
+                    <a:lstStyle/>
+                    <a:p>
+                      <a:pPr algn="ctr"/>
+                      <a:endParaRPr lang="es-ES" dirty="0"/>
+                    </a:p>
+                    <a:p>
+                      <a:pPr algn="ctr"/>
+                      <a:r>
+                        <a:rPr lang="es-ES" dirty="0"/>
+                        <a:t>3º</a:t>
+                      </a:r>
+                    </a:p>
+                  </a:txBody>
+                  <a:tcPr/>
+                </a:tc>
+                <a:tc>
+                  <a:txBody>
+                    <a:bodyPr/>
+                    <a:lstStyle/>
+                    <a:p>
+                      <a:pPr algn="ctr"/>
+                      <a:endParaRPr lang="es-ES" dirty="0"/>
+                    </a:p>
+                    <a:p>
+                      <a:pPr algn="ctr"/>
+                      <a:r>
+                        <a:rPr lang="es-ES" dirty="0"/>
+                        <a:t>2º</a:t>
+                      </a:r>
+                    </a:p>
+                  </a:txBody>
+                  <a:tcPr/>
+                </a:tc>
+                <a:tc>
+                  <a:txBody>
+                    <a:bodyPr/>
+                    <a:lstStyle/>
+                    <a:p>
+                      <a:pPr algn="ctr"/>
+                      <a:endParaRPr lang="es-ES" dirty="0"/>
+                    </a:p>
+                    <a:p>
+                      <a:pPr algn="ctr"/>
+                      <a:r>
+                        <a:rPr lang="es-ES" dirty="0"/>
+                        <a:t>4º</a:t>
+                      </a:r>
+                    </a:p>
+                  </a:txBody>
+                  <a:tcPr/>
+                </a:tc>
+                <a:tc>
+                  <a:txBody>
+                    <a:bodyPr/>
+                    <a:lstStyle/>
+                    <a:p>
+                      <a:pPr algn="ctr"/>
+                      <a:endParaRPr lang="es-ES" dirty="0"/>
+                    </a:p>
+                    <a:p>
+                      <a:pPr algn="ctr"/>
+                      <a:r>
+                        <a:rPr lang="es-ES" dirty="0"/>
+                        <a:t>5º</a:t>
+                      </a:r>
+                    </a:p>
+                  </a:txBody>
+                  <a:tcPr/>
+                </a:tc>
+                <a:tc>
+                  <a:txBody>
+                    <a:bodyPr/>
+                    <a:lstStyle/>
+                    <a:p>
+                      <a:pPr algn="ctr"/>
+                      <a:endParaRPr lang="es-ES" dirty="0"/>
+                    </a:p>
+                    <a:p>
+                      <a:pPr algn="ctr"/>
+                      <a:r>
+                        <a:rPr lang="es-ES" dirty="0"/>
+                        <a:t>6º</a:t>
+                      </a:r>
+                    </a:p>
+                  </a:txBody>
+                  <a:tcPr/>
+                </a:tc>
+                <a:tc>
+                  <a:txBody>
+                    <a:bodyPr/>
+                    <a:lstStyle/>
+                    <a:p>
+                      <a:pPr algn="ctr"/>
+                      <a:endParaRPr lang="es-ES" dirty="0"/>
+                    </a:p>
+                    <a:p>
+                      <a:pPr algn="ctr"/>
+                      <a:r>
+                        <a:rPr lang="es-ES" dirty="0"/>
+                        <a:t>7º</a:t>
+                      </a:r>
+                    </a:p>
+                  </a:txBody>
+                  <a:tcPr/>
+                </a:tc>
+                <a:extLst>
+                  <a:ext uri="{0D108BD9-81ED-4DB2-BD59-A6C34878D82A}">
+                    <a16:rowId xmlns:a16="http://schemas.microsoft.com/office/drawing/2014/main" val="1530523113"/>
+                  </a:ext>
+                </a:extLst>
+              </a:tr>
+            </a:tbl>
+          </a:graphicData>
+        </a:graphic>
+      </p:graphicFrame>
+      <p:graphicFrame>
+        <p:nvGraphicFramePr>
+          <p:cNvPr id="5" name="Tabla 5">
+            <a:extLst>
+              <a:ext uri="{FF2B5EF4-FFF2-40B4-BE49-F238E27FC236}">
+                <a16:creationId xmlns:a16="http://schemas.microsoft.com/office/drawing/2014/main" id="{ED5DAAE4-7DFD-EF4E-8F3B-F1C834A96769}"/>
+              </a:ext>
+            </a:extLst>
+          </p:cNvPr>
+          <p:cNvGraphicFramePr>
+            <a:graphicFrameLocks noGrp="1"/>
+          </p:cNvGraphicFramePr>
+          <p:nvPr>
+            <p:extLst>
+              <p:ext uri="{D42A27DB-BD31-4B8C-83A1-F6EECF244321}">
+                <p14:modId xmlns:p14="http://schemas.microsoft.com/office/powerpoint/2010/main" val="3461294420"/>
+              </p:ext>
+            </p:extLst>
+          </p:nvPr>
+        </p:nvGraphicFramePr>
+        <p:xfrm>
+          <a:off x="2030412" y="5919442"/>
+          <a:ext cx="8128000" cy="640080"/>
+        </p:xfrm>
+        <a:graphic>
+          <a:graphicData uri="http://schemas.openxmlformats.org/drawingml/2006/table">
+            <a:tbl>
+              <a:tblPr firstRow="1" bandRow="1">
+                <a:tableStyleId>{7DF18680-E054-41AD-8BC1-D1AEF772440D}</a:tableStyleId>
+              </a:tblPr>
+              <a:tblGrid>
+                <a:gridCol w="2032000">
+                  <a:extLst>
+                    <a:ext uri="{9D8B030D-6E8A-4147-A177-3AD203B41FA5}">
+                      <a16:colId xmlns:a16="http://schemas.microsoft.com/office/drawing/2014/main" val="992088682"/>
+                    </a:ext>
+                  </a:extLst>
+                </a:gridCol>
+                <a:gridCol w="2032000">
+                  <a:extLst>
+                    <a:ext uri="{9D8B030D-6E8A-4147-A177-3AD203B41FA5}">
+                      <a16:colId xmlns:a16="http://schemas.microsoft.com/office/drawing/2014/main" val="3204250065"/>
+                    </a:ext>
+                  </a:extLst>
+                </a:gridCol>
+                <a:gridCol w="2032000">
+                  <a:extLst>
+                    <a:ext uri="{9D8B030D-6E8A-4147-A177-3AD203B41FA5}">
+                      <a16:colId xmlns:a16="http://schemas.microsoft.com/office/drawing/2014/main" val="927845802"/>
+                    </a:ext>
+                  </a:extLst>
+                </a:gridCol>
+                <a:gridCol w="2032000">
+                  <a:extLst>
+                    <a:ext uri="{9D8B030D-6E8A-4147-A177-3AD203B41FA5}">
+                      <a16:colId xmlns:a16="http://schemas.microsoft.com/office/drawing/2014/main" val="1358033057"/>
+                    </a:ext>
+                  </a:extLst>
+                </a:gridCol>
+              </a:tblGrid>
+              <a:tr h="370840">
+                <a:tc>
+                  <a:txBody>
+                    <a:bodyPr/>
+                    <a:lstStyle/>
+                    <a:p>
+                      <a:pPr algn="ctr"/>
+                      <a:r>
+                        <a:rPr lang="es-ES" dirty="0"/>
+                        <a:t>Nº semanas secuencialmente</a:t>
+                      </a:r>
+                    </a:p>
+                  </a:txBody>
+                  <a:tcPr/>
+                </a:tc>
+                <a:tc>
+                  <a:txBody>
+                    <a:bodyPr/>
+                    <a:lstStyle/>
+                    <a:p>
+                      <a:pPr algn="ctr"/>
+                      <a:r>
+                        <a:rPr lang="es-ES" dirty="0"/>
+                        <a:t>14</a:t>
+                      </a:r>
+                    </a:p>
+                  </a:txBody>
+                  <a:tcPr/>
+                </a:tc>
+                <a:tc>
+                  <a:txBody>
+                    <a:bodyPr/>
+                    <a:lstStyle/>
+                    <a:p>
+                      <a:pPr algn="ctr"/>
+                      <a:r>
+                        <a:rPr lang="es-ES" dirty="0"/>
+                        <a:t>Nº de semanas</a:t>
+                      </a:r>
+                    </a:p>
+                    <a:p>
+                      <a:pPr algn="ctr"/>
+                      <a:r>
+                        <a:rPr lang="es-ES" dirty="0"/>
+                        <a:t>estimadas</a:t>
+                      </a:r>
+                    </a:p>
+                  </a:txBody>
+                  <a:tcPr/>
+                </a:tc>
+                <a:tc>
+                  <a:txBody>
+                    <a:bodyPr/>
+                    <a:lstStyle/>
+                    <a:p>
+                      <a:pPr algn="ctr"/>
+                      <a:r>
+                        <a:rPr lang="es-ES" dirty="0"/>
+                        <a:t>10</a:t>
+                      </a:r>
+                    </a:p>
+                  </a:txBody>
+                  <a:tcPr/>
+                </a:tc>
+                <a:extLst>
+                  <a:ext uri="{0D108BD9-81ED-4DB2-BD59-A6C34878D82A}">
+                    <a16:rowId xmlns:a16="http://schemas.microsoft.com/office/drawing/2014/main" val="2130108811"/>
+                  </a:ext>
+                </a:extLst>
+              </a:tr>
+            </a:tbl>
+          </a:graphicData>
+        </a:graphic>
+      </p:graphicFrame>
     </p:spTree>
     <p:extLst>
       <p:ext uri="{BB962C8B-B14F-4D97-AF65-F5344CB8AC3E}">

</xml_diff>